<commit_message>
Added InterimReport files to repo
</commit_message>
<xml_diff>
--- a/Presentation/presentation.pptx
+++ b/Presentation/presentation.pptx
@@ -12,13 +12,17 @@
     <p:sldId id="261" r:id="rId6"/>
     <p:sldId id="262" r:id="rId7"/>
     <p:sldId id="260" r:id="rId8"/>
-    <p:sldId id="263" r:id="rId9"/>
-    <p:sldId id="264" r:id="rId10"/>
-    <p:sldId id="269" r:id="rId11"/>
-    <p:sldId id="265" r:id="rId12"/>
-    <p:sldId id="266" r:id="rId13"/>
-    <p:sldId id="267" r:id="rId14"/>
-    <p:sldId id="268" r:id="rId15"/>
+    <p:sldId id="264" r:id="rId9"/>
+    <p:sldId id="269" r:id="rId10"/>
+    <p:sldId id="265" r:id="rId11"/>
+    <p:sldId id="266" r:id="rId12"/>
+    <p:sldId id="267" r:id="rId13"/>
+    <p:sldId id="268" r:id="rId14"/>
+    <p:sldId id="274" r:id="rId15"/>
+    <p:sldId id="270" r:id="rId16"/>
+    <p:sldId id="272" r:id="rId17"/>
+    <p:sldId id="271" r:id="rId18"/>
+    <p:sldId id="273" r:id="rId19"/>
   </p:sldIdLst>
   <p:sldSz cx="9144000" cy="6858000" type="screen4x3"/>
   <p:notesSz cx="6858000" cy="9144000"/>
@@ -5195,109 +5199,94 @@
         </p:nvSpPr>
         <p:spPr/>
         <p:txBody>
+          <a:bodyPr>
+            <a:normAutofit/>
+          </a:bodyPr>
+          <a:lstStyle/>
+          <a:p>
+            <a:r>
+              <a:rPr lang="en-US" dirty="0"/>
+              <a:t>Performance </a:t>
+            </a:r>
+            <a:r>
+              <a:rPr lang="en-US" dirty="0" smtClean="0"/>
+              <a:t>measures</a:t>
+            </a:r>
+            <a:endParaRPr lang="en-US" dirty="0"/>
+          </a:p>
+        </p:txBody>
+      </p:sp>
+      <p:sp>
+        <p:nvSpPr>
+          <p:cNvPr id="3" name="Content Placeholder 2"/>
+          <p:cNvSpPr>
+            <a:spLocks noGrp="1"/>
+          </p:cNvSpPr>
+          <p:nvPr>
+            <p:ph idx="1"/>
+          </p:nvPr>
+        </p:nvSpPr>
+        <p:spPr/>
+        <p:txBody>
           <a:bodyPr/>
           <a:lstStyle/>
           <a:p>
             <a:r>
-              <a:rPr lang="en-US" dirty="0"/>
-              <a:t>Network </a:t>
-            </a:r>
-            <a:r>
               <a:rPr lang="en-US" dirty="0" smtClean="0"/>
-              <a:t>topologys</a:t>
-            </a:r>
+              <a:t>Throughput</a:t>
+            </a:r>
+          </a:p>
+          <a:p>
+            <a:r>
+              <a:rPr lang="en-US" dirty="0" smtClean="0"/>
+              <a:t>Latency</a:t>
+            </a:r>
+          </a:p>
+          <a:p>
             <a:endParaRPr lang="en-US" dirty="0"/>
           </a:p>
-        </p:txBody>
-      </p:sp>
-      <p:sp>
-        <p:nvSpPr>
-          <p:cNvPr id="11" name="Text Placeholder 10"/>
-          <p:cNvSpPr>
-            <a:spLocks noGrp="1"/>
-          </p:cNvSpPr>
-          <p:nvPr>
-            <p:ph type="body" idx="1"/>
-          </p:nvPr>
-        </p:nvSpPr>
-        <p:spPr/>
-        <p:txBody>
-          <a:bodyPr/>
-          <a:lstStyle/>
           <a:p>
             <a:r>
               <a:rPr lang="en-US" dirty="0" smtClean="0"/>
-              <a:t>Mesh</a:t>
-            </a:r>
-            <a:endParaRPr lang="en-US" dirty="0"/>
-          </a:p>
-        </p:txBody>
-      </p:sp>
-      <p:sp>
-        <p:nvSpPr>
-          <p:cNvPr id="12" name="Text Placeholder 11"/>
-          <p:cNvSpPr>
-            <a:spLocks noGrp="1"/>
-          </p:cNvSpPr>
-          <p:nvPr>
-            <p:ph type="body" sz="quarter" idx="3"/>
-          </p:nvPr>
-        </p:nvSpPr>
-        <p:spPr/>
-        <p:txBody>
-          <a:bodyPr/>
-          <a:lstStyle/>
-          <a:p>
-            <a:r>
-              <a:rPr lang="en-US" dirty="0" smtClean="0"/>
-              <a:t>Unstructured</a:t>
-            </a:r>
+              <a:t>Monitoring network interfaces</a:t>
+            </a:r>
+          </a:p>
+          <a:p>
+            <a:pPr marL="0" indent="0">
+              <a:buNone/>
+            </a:pPr>
             <a:endParaRPr lang="en-US" dirty="0"/>
           </a:p>
         </p:txBody>
       </p:sp>
       <p:pic>
         <p:nvPicPr>
-          <p:cNvPr id="4" name="Content Placeholder 3"/>
+          <p:cNvPr id="4" name="Picture 3"/>
           <p:cNvPicPr>
-            <a:picLocks noGrp="1" noChangeAspect="1"/>
+            <a:picLocks noChangeAspect="1"/>
           </p:cNvPicPr>
-          <p:nvPr>
-            <p:ph sz="quarter" idx="13"/>
-          </p:nvPr>
+          <p:nvPr/>
         </p:nvPicPr>
         <p:blipFill>
           <a:blip r:embed="rId2"/>
-          <a:srcRect t="-1095" b="-1095"/>
           <a:stretch>
             <a:fillRect/>
           </a:stretch>
         </p:blipFill>
-        <p:spPr/>
-      </p:pic>
-      <p:pic>
-        <p:nvPicPr>
-          <p:cNvPr id="14" name="Content Placeholder 13"/>
-          <p:cNvPicPr>
-            <a:picLocks noGrp="1" noChangeAspect="1"/>
-          </p:cNvPicPr>
-          <p:nvPr>
-            <p:ph sz="quarter" idx="14"/>
-          </p:nvPr>
-        </p:nvPicPr>
-        <p:blipFill>
-          <a:blip r:embed="rId3"/>
-          <a:srcRect t="-3394" b="-3394"/>
-          <a:stretch>
-            <a:fillRect/>
-          </a:stretch>
-        </p:blipFill>
-        <p:spPr/>
+        <p:spPr>
+          <a:xfrm>
+            <a:off x="3566190" y="4181857"/>
+            <a:ext cx="1982959" cy="1541211"/>
+          </a:xfrm>
+          <a:prstGeom prst="rect">
+            <a:avLst/>
+          </a:prstGeom>
+        </p:spPr>
       </p:pic>
     </p:spTree>
     <p:extLst>
       <p:ext uri="{BB962C8B-B14F-4D97-AF65-F5344CB8AC3E}">
-        <p14:creationId xmlns:p14="http://schemas.microsoft.com/office/powerpoint/2010/main" val="882041453"/>
+        <p14:creationId xmlns:p14="http://schemas.microsoft.com/office/powerpoint/2010/main" val="1736056346"/>
       </p:ext>
     </p:extLst>
   </p:cSld>
@@ -5344,17 +5333,17 @@
         <p:spPr/>
         <p:txBody>
           <a:bodyPr>
-            <a:normAutofit/>
+            <a:normAutofit fontScale="90000"/>
           </a:bodyPr>
           <a:lstStyle/>
           <a:p>
             <a:r>
               <a:rPr lang="en-US" dirty="0"/>
-              <a:t>Performance </a:t>
+              <a:t>Point to point </a:t>
             </a:r>
             <a:r>
               <a:rPr lang="en-US" dirty="0" smtClean="0"/>
-              <a:t>measures</a:t>
+              <a:t>synchronisation</a:t>
             </a:r>
             <a:endParaRPr lang="en-US" dirty="0"/>
           </a:p>
@@ -5372,17 +5361,78 @@
         </p:nvSpPr>
         <p:spPr/>
         <p:txBody>
-          <a:bodyPr/>
-          <a:lstStyle/>
-          <a:p>
-            <a:endParaRPr lang="en-US"/>
+          <a:bodyPr>
+            <a:normAutofit fontScale="92500"/>
+          </a:bodyPr>
+          <a:lstStyle/>
+          <a:p>
+            <a:r>
+              <a:rPr lang="en-US" dirty="0" smtClean="0"/>
+              <a:t>Copy</a:t>
+            </a:r>
+          </a:p>
+          <a:p>
+            <a:endParaRPr lang="en-US" dirty="0" smtClean="0"/>
+          </a:p>
+          <a:p>
+            <a:r>
+              <a:rPr lang="en-US" dirty="0" smtClean="0"/>
+              <a:t>Rsync</a:t>
+            </a:r>
+          </a:p>
+          <a:p>
+            <a:pPr marL="0" indent="0">
+              <a:buNone/>
+            </a:pPr>
+            <a:endParaRPr lang="en-US" dirty="0" smtClean="0"/>
+          </a:p>
+          <a:p>
+            <a:r>
+              <a:rPr lang="en-US" dirty="0" smtClean="0"/>
+              <a:t>Unison</a:t>
+            </a:r>
+          </a:p>
+          <a:p>
+            <a:pPr lvl="1"/>
+            <a:r>
+              <a:rPr lang="en-US" dirty="0" smtClean="0"/>
+              <a:t>Two way replication tool</a:t>
+            </a:r>
+          </a:p>
+          <a:p>
+            <a:pPr lvl="1"/>
+            <a:r>
+              <a:rPr lang="en-US" dirty="0" smtClean="0"/>
+              <a:t>Free open source</a:t>
+            </a:r>
+          </a:p>
+          <a:p>
+            <a:pPr lvl="1"/>
+            <a:r>
+              <a:rPr lang="en-US" dirty="0" smtClean="0"/>
+              <a:t>Runs on many platforms (windows,os x, linux)</a:t>
+            </a:r>
+          </a:p>
+          <a:p>
+            <a:pPr lvl="1"/>
+            <a:r>
+              <a:rPr lang="en-US" dirty="0" smtClean="0"/>
+              <a:t>Keeps itself in a tidy state incase of failure</a:t>
+            </a:r>
+          </a:p>
+          <a:p>
+            <a:pPr lvl="1"/>
+            <a:endParaRPr lang="en-US" dirty="0" smtClean="0"/>
+          </a:p>
+          <a:p>
+            <a:endParaRPr lang="en-US" dirty="0"/>
           </a:p>
         </p:txBody>
       </p:sp>
     </p:spTree>
     <p:extLst>
       <p:ext uri="{BB962C8B-B14F-4D97-AF65-F5344CB8AC3E}">
-        <p14:creationId xmlns:p14="http://schemas.microsoft.com/office/powerpoint/2010/main" val="1736056346"/>
+        <p14:creationId xmlns:p14="http://schemas.microsoft.com/office/powerpoint/2010/main" val="663409396"/>
       </p:ext>
     </p:extLst>
   </p:cSld>
@@ -5428,46 +5478,101 @@
         </p:nvSpPr>
         <p:spPr/>
         <p:txBody>
-          <a:bodyPr>
-            <a:normAutofit fontScale="90000"/>
-          </a:bodyPr>
+          <a:bodyPr/>
+          <a:lstStyle/>
+          <a:p>
+            <a:r>
+              <a:rPr lang="en-US" dirty="0" smtClean="0"/>
+              <a:t>File system changes</a:t>
+            </a:r>
+            <a:endParaRPr lang="en-US" dirty="0"/>
+          </a:p>
+        </p:txBody>
+      </p:sp>
+      <p:sp>
+        <p:nvSpPr>
+          <p:cNvPr id="3" name="Content Placeholder 2"/>
+          <p:cNvSpPr>
+            <a:spLocks noGrp="1"/>
+          </p:cNvSpPr>
+          <p:nvPr>
+            <p:ph idx="1"/>
+          </p:nvPr>
+        </p:nvSpPr>
+        <p:spPr/>
+        <p:txBody>
+          <a:bodyPr/>
           <a:lstStyle/>
           <a:p>
             <a:r>
               <a:rPr lang="en-US" dirty="0"/>
-              <a:t>Point to point </a:t>
+              <a:t>How does it work</a:t>
             </a:r>
             <a:r>
               <a:rPr lang="en-US" dirty="0" smtClean="0"/>
-              <a:t>synchronisation</a:t>
-            </a:r>
+              <a:t>?</a:t>
+            </a:r>
+          </a:p>
+          <a:p>
+            <a:pPr lvl="1"/>
+            <a:r>
+              <a:rPr lang="en-US" dirty="0" smtClean="0"/>
+              <a:t>Python script built on pyinotify</a:t>
+            </a:r>
+          </a:p>
+          <a:p>
+            <a:pPr lvl="1"/>
+            <a:r>
+              <a:rPr lang="en-US" dirty="0" smtClean="0"/>
+              <a:t>Reads directories and hosts from config file</a:t>
+            </a:r>
+          </a:p>
+          <a:p>
+            <a:pPr lvl="1"/>
             <a:endParaRPr lang="en-US" dirty="0"/>
           </a:p>
-        </p:txBody>
-      </p:sp>
-      <p:sp>
-        <p:nvSpPr>
-          <p:cNvPr id="3" name="Content Placeholder 2"/>
-          <p:cNvSpPr>
-            <a:spLocks noGrp="1"/>
-          </p:cNvSpPr>
-          <p:nvPr>
-            <p:ph idx="1"/>
-          </p:nvPr>
-        </p:nvSpPr>
-        <p:spPr/>
-        <p:txBody>
-          <a:bodyPr/>
-          <a:lstStyle/>
-          <a:p>
-            <a:endParaRPr lang="en-US"/>
+          <a:p>
+            <a:pPr lvl="1"/>
+            <a:r>
+              <a:rPr lang="en-US" dirty="0" smtClean="0"/>
+              <a:t>Inotify (Linux)</a:t>
+            </a:r>
+          </a:p>
+          <a:p>
+            <a:pPr lvl="2"/>
+            <a:r>
+              <a:rPr lang="en-US" dirty="0" smtClean="0"/>
+              <a:t>Linux kernel subsystem to notices changes to the filesystem</a:t>
+            </a:r>
+          </a:p>
+          <a:p>
+            <a:pPr lvl="1"/>
+            <a:r>
+              <a:rPr lang="en-US" dirty="0" smtClean="0"/>
+              <a:t>FSEvents, kqueue (OS X)</a:t>
+            </a:r>
+          </a:p>
+          <a:p>
+            <a:pPr lvl="1"/>
+            <a:r>
+              <a:rPr lang="en-US" dirty="0" smtClean="0"/>
+              <a:t>ReadDirectoryChangesW (Windows)</a:t>
+            </a:r>
+          </a:p>
+          <a:p>
+            <a:pPr lvl="2"/>
+            <a:endParaRPr lang="en-US" dirty="0" smtClean="0"/>
+          </a:p>
+          <a:p>
+            <a:pPr lvl="1"/>
+            <a:endParaRPr lang="en-US" dirty="0"/>
           </a:p>
         </p:txBody>
       </p:sp>
     </p:spTree>
     <p:extLst>
       <p:ext uri="{BB962C8B-B14F-4D97-AF65-F5344CB8AC3E}">
-        <p14:creationId xmlns:p14="http://schemas.microsoft.com/office/powerpoint/2010/main" val="663409396"/>
+        <p14:creationId xmlns:p14="http://schemas.microsoft.com/office/powerpoint/2010/main" val="3230278854"/>
       </p:ext>
     </p:extLst>
   </p:cSld>
@@ -5516,7 +5621,11 @@
           <a:bodyPr/>
           <a:lstStyle/>
           <a:p>
-            <a:endParaRPr lang="en-US"/>
+            <a:r>
+              <a:rPr lang="en-US" dirty="0" smtClean="0"/>
+              <a:t>Next steps</a:t>
+            </a:r>
+            <a:endParaRPr lang="en-US" dirty="0"/>
           </a:p>
         </p:txBody>
       </p:sp>
@@ -5535,20 +5644,73 @@
           <a:bodyPr/>
           <a:lstStyle/>
           <a:p>
-            <a:endParaRPr lang="en-US"/>
-          </a:p>
-        </p:txBody>
-      </p:sp>
+            <a:r>
+              <a:rPr lang="en-US" dirty="0" smtClean="0"/>
+              <a:t>Sub-nodes</a:t>
+            </a:r>
+          </a:p>
+          <a:p>
+            <a:r>
+              <a:rPr lang="en-US" dirty="0" smtClean="0"/>
+              <a:t>Mobile nodes</a:t>
+            </a:r>
+          </a:p>
+          <a:p>
+            <a:r>
+              <a:rPr lang="en-US" dirty="0" smtClean="0"/>
+              <a:t>Statistics</a:t>
+            </a:r>
+          </a:p>
+          <a:p>
+            <a:r>
+              <a:rPr lang="en-US" dirty="0" smtClean="0"/>
+              <a:t>More user control</a:t>
+            </a:r>
+            <a:endParaRPr lang="en-US" dirty="0"/>
+          </a:p>
+        </p:txBody>
+      </p:sp>
+      <p:pic>
+        <p:nvPicPr>
+          <p:cNvPr id="5" name="Picture 4"/>
+          <p:cNvPicPr>
+            <a:picLocks noChangeAspect="1"/>
+          </p:cNvPicPr>
+          <p:nvPr/>
+        </p:nvPicPr>
+        <p:blipFill>
+          <a:blip r:embed="rId2"/>
+          <a:stretch>
+            <a:fillRect/>
+          </a:stretch>
+        </p:blipFill>
+        <p:spPr>
+          <a:xfrm>
+            <a:off x="5757436" y="2639791"/>
+            <a:ext cx="1902009" cy="2092210"/>
+          </a:xfrm>
+          <a:prstGeom prst="rect">
+            <a:avLst/>
+          </a:prstGeom>
+        </p:spPr>
+      </p:pic>
     </p:spTree>
     <p:extLst>
       <p:ext uri="{BB962C8B-B14F-4D97-AF65-F5344CB8AC3E}">
-        <p14:creationId xmlns:p14="http://schemas.microsoft.com/office/powerpoint/2010/main" val="3230278854"/>
+        <p14:creationId xmlns:p14="http://schemas.microsoft.com/office/powerpoint/2010/main" val="1113579066"/>
       </p:ext>
     </p:extLst>
   </p:cSld>
   <p:clrMapOvr>
     <a:masterClrMapping/>
   </p:clrMapOvr>
+  <p:timing>
+    <p:tnLst>
+      <p:par>
+        <p:cTn xmlns:p14="http://schemas.microsoft.com/office/powerpoint/2010/main" id="1" dur="indefinite" restart="never" nodeType="tmRoot"/>
+      </p:par>
+    </p:tnLst>
+  </p:timing>
 </p:sld>
 </file>
 
@@ -5579,44 +5741,538 @@
             <p:ph type="title"/>
           </p:nvPr>
         </p:nvSpPr>
+        <p:spPr>
+          <a:xfrm rot="-60000">
+            <a:off x="1106424" y="509024"/>
+            <a:ext cx="3063240" cy="1499616"/>
+          </a:xfrm>
+        </p:spPr>
+        <p:txBody>
+          <a:bodyPr/>
+          <a:lstStyle/>
+          <a:p>
+            <a:r>
+              <a:rPr lang="en-US" dirty="0" smtClean="0"/>
+              <a:t>Sub-nodes</a:t>
+            </a:r>
+            <a:endParaRPr lang="en-US" dirty="0"/>
+          </a:p>
+        </p:txBody>
+      </p:sp>
+      <p:pic>
+        <p:nvPicPr>
+          <p:cNvPr id="6" name="Content Placeholder 5"/>
+          <p:cNvPicPr>
+            <a:picLocks noGrp="1" noChangeAspect="1"/>
+          </p:cNvPicPr>
+          <p:nvPr>
+            <p:ph type="pic" idx="1"/>
+          </p:nvPr>
+        </p:nvPicPr>
+        <p:blipFill>
+          <a:blip r:embed="rId2"/>
+          <a:srcRect t="-5432" b="-5432"/>
+          <a:stretch>
+            <a:fillRect/>
+          </a:stretch>
+        </p:blipFill>
         <p:spPr/>
-        <p:txBody>
-          <a:bodyPr/>
-          <a:lstStyle/>
-          <a:p>
-            <a:endParaRPr lang="en-US"/>
-          </a:p>
-        </p:txBody>
-      </p:sp>
-      <p:sp>
-        <p:nvSpPr>
-          <p:cNvPr id="3" name="Content Placeholder 2"/>
-          <p:cNvSpPr>
-            <a:spLocks noGrp="1"/>
-          </p:cNvSpPr>
-          <p:nvPr>
-            <p:ph idx="1"/>
-          </p:nvPr>
-        </p:nvSpPr>
-        <p:spPr/>
-        <p:txBody>
-          <a:bodyPr/>
-          <a:lstStyle/>
-          <a:p>
-            <a:endParaRPr lang="en-US"/>
+      </p:pic>
+      <p:sp>
+        <p:nvSpPr>
+          <p:cNvPr id="9" name="Text Placeholder 8"/>
+          <p:cNvSpPr>
+            <a:spLocks noGrp="1"/>
+          </p:cNvSpPr>
+          <p:nvPr>
+            <p:ph type="body" sz="half" idx="2"/>
+          </p:nvPr>
+        </p:nvSpPr>
+        <p:spPr>
+          <a:xfrm rot="-60000">
+            <a:off x="1152144" y="2109224"/>
+            <a:ext cx="3044952" cy="2103120"/>
+          </a:xfrm>
+        </p:spPr>
+        <p:txBody>
+          <a:bodyPr>
+            <a:normAutofit lnSpcReduction="10000"/>
+          </a:bodyPr>
+          <a:lstStyle/>
+          <a:p>
+            <a:r>
+              <a:rPr lang="en-US" dirty="0" smtClean="0"/>
+              <a:t>How out of date is the graph at any given time?</a:t>
+            </a:r>
+          </a:p>
+          <a:p>
+            <a:endParaRPr lang="en-US" dirty="0"/>
+          </a:p>
+          <a:p>
+            <a:r>
+              <a:rPr lang="en-US" dirty="0" smtClean="0"/>
+              <a:t>How long do we expect it to take to become completely up to date?</a:t>
+            </a:r>
+          </a:p>
+          <a:p>
+            <a:endParaRPr lang="en-US" dirty="0"/>
+          </a:p>
+          <a:p>
+            <a:r>
+              <a:rPr lang="en-US" dirty="0" smtClean="0"/>
+              <a:t>Can we improve this?</a:t>
+            </a:r>
+            <a:endParaRPr lang="en-US" dirty="0"/>
           </a:p>
         </p:txBody>
       </p:sp>
     </p:spTree>
     <p:extLst>
       <p:ext uri="{BB962C8B-B14F-4D97-AF65-F5344CB8AC3E}">
-        <p14:creationId xmlns:p14="http://schemas.microsoft.com/office/powerpoint/2010/main" val="1113579066"/>
+        <p14:creationId xmlns:p14="http://schemas.microsoft.com/office/powerpoint/2010/main" val="3833530778"/>
       </p:ext>
     </p:extLst>
   </p:cSld>
   <p:clrMapOvr>
     <a:masterClrMapping/>
   </p:clrMapOvr>
+  <p:timing>
+    <p:tnLst>
+      <p:par>
+        <p:cTn xmlns:p14="http://schemas.microsoft.com/office/powerpoint/2010/main" id="1" dur="indefinite" restart="never" nodeType="tmRoot"/>
+      </p:par>
+    </p:tnLst>
+  </p:timing>
+</p:sld>
+</file>
+
+<file path=ppt/slides/slide15.xml><?xml version="1.0" encoding="utf-8"?>
+<p:sld xmlns:a="http://schemas.openxmlformats.org/drawingml/2006/main" xmlns:r="http://schemas.openxmlformats.org/officeDocument/2006/relationships" xmlns:p="http://schemas.openxmlformats.org/presentationml/2006/main">
+  <p:cSld>
+    <p:spTree>
+      <p:nvGrpSpPr>
+        <p:cNvPr id="1" name=""/>
+        <p:cNvGrpSpPr/>
+        <p:nvPr/>
+      </p:nvGrpSpPr>
+      <p:grpSpPr>
+        <a:xfrm>
+          <a:off x="0" y="0"/>
+          <a:ext cx="0" cy="0"/>
+          <a:chOff x="0" y="0"/>
+          <a:chExt cx="0" cy="0"/>
+        </a:xfrm>
+      </p:grpSpPr>
+      <p:sp>
+        <p:nvSpPr>
+          <p:cNvPr id="2" name="Title 1"/>
+          <p:cNvSpPr>
+            <a:spLocks noGrp="1"/>
+          </p:cNvSpPr>
+          <p:nvPr>
+            <p:ph type="title"/>
+          </p:nvPr>
+        </p:nvSpPr>
+        <p:spPr>
+          <a:xfrm rot="-60000">
+            <a:off x="1106424" y="524142"/>
+            <a:ext cx="3063240" cy="1499616"/>
+          </a:xfrm>
+        </p:spPr>
+        <p:txBody>
+          <a:bodyPr/>
+          <a:lstStyle/>
+          <a:p>
+            <a:r>
+              <a:rPr lang="en-US" dirty="0" smtClean="0"/>
+              <a:t>Mobile nodes</a:t>
+            </a:r>
+            <a:endParaRPr lang="en-US" dirty="0"/>
+          </a:p>
+        </p:txBody>
+      </p:sp>
+      <p:sp>
+        <p:nvSpPr>
+          <p:cNvPr id="5" name="Text Placeholder 4"/>
+          <p:cNvSpPr>
+            <a:spLocks noGrp="1"/>
+          </p:cNvSpPr>
+          <p:nvPr>
+            <p:ph type="body" sz="half" idx="2"/>
+          </p:nvPr>
+        </p:nvSpPr>
+        <p:spPr>
+          <a:xfrm rot="-60000">
+            <a:off x="1152144" y="2124342"/>
+            <a:ext cx="3044952" cy="2103120"/>
+          </a:xfrm>
+        </p:spPr>
+        <p:txBody>
+          <a:bodyPr/>
+          <a:lstStyle/>
+          <a:p>
+            <a:r>
+              <a:rPr lang="en-US" dirty="0" smtClean="0"/>
+              <a:t>Say node two intermittently has a connection to a subset of nodes 1,3 and 4</a:t>
+            </a:r>
+          </a:p>
+          <a:p>
+            <a:endParaRPr lang="en-US" dirty="0"/>
+          </a:p>
+          <a:p>
+            <a:r>
+              <a:rPr lang="en-US" dirty="0" smtClean="0"/>
+              <a:t>How does this affect the graph over time?</a:t>
+            </a:r>
+            <a:endParaRPr lang="en-US" dirty="0"/>
+          </a:p>
+        </p:txBody>
+      </p:sp>
+      <p:pic>
+        <p:nvPicPr>
+          <p:cNvPr id="8" name="Picture Placeholder 7"/>
+          <p:cNvPicPr>
+            <a:picLocks noGrp="1" noChangeAspect="1"/>
+          </p:cNvPicPr>
+          <p:nvPr>
+            <p:ph type="pic" idx="1"/>
+          </p:nvPr>
+        </p:nvPicPr>
+        <p:blipFill>
+          <a:blip r:embed="rId2"/>
+          <a:srcRect t="-46588" b="-46588"/>
+          <a:stretch>
+            <a:fillRect/>
+          </a:stretch>
+        </p:blipFill>
+        <p:spPr/>
+      </p:pic>
+    </p:spTree>
+    <p:extLst>
+      <p:ext uri="{BB962C8B-B14F-4D97-AF65-F5344CB8AC3E}">
+        <p14:creationId xmlns:p14="http://schemas.microsoft.com/office/powerpoint/2010/main" val="11960410"/>
+      </p:ext>
+    </p:extLst>
+  </p:cSld>
+  <p:clrMapOvr>
+    <a:masterClrMapping/>
+  </p:clrMapOvr>
+  <p:timing>
+    <p:tnLst>
+      <p:par>
+        <p:cTn xmlns:p14="http://schemas.microsoft.com/office/powerpoint/2010/main" id="1" dur="indefinite" restart="never" nodeType="tmRoot"/>
+      </p:par>
+    </p:tnLst>
+  </p:timing>
+</p:sld>
+</file>
+
+<file path=ppt/slides/slide16.xml><?xml version="1.0" encoding="utf-8"?>
+<p:sld xmlns:a="http://schemas.openxmlformats.org/drawingml/2006/main" xmlns:r="http://schemas.openxmlformats.org/officeDocument/2006/relationships" xmlns:p="http://schemas.openxmlformats.org/presentationml/2006/main">
+  <p:cSld>
+    <p:spTree>
+      <p:nvGrpSpPr>
+        <p:cNvPr id="1" name=""/>
+        <p:cNvGrpSpPr/>
+        <p:nvPr/>
+      </p:nvGrpSpPr>
+      <p:grpSpPr>
+        <a:xfrm>
+          <a:off x="0" y="0"/>
+          <a:ext cx="0" cy="0"/>
+          <a:chOff x="0" y="0"/>
+          <a:chExt cx="0" cy="0"/>
+        </a:xfrm>
+      </p:grpSpPr>
+      <p:sp>
+        <p:nvSpPr>
+          <p:cNvPr id="2" name="Title 1"/>
+          <p:cNvSpPr>
+            <a:spLocks noGrp="1"/>
+          </p:cNvSpPr>
+          <p:nvPr>
+            <p:ph type="title"/>
+          </p:nvPr>
+        </p:nvSpPr>
+        <p:spPr/>
+        <p:txBody>
+          <a:bodyPr/>
+          <a:lstStyle/>
+          <a:p>
+            <a:r>
+              <a:rPr lang="en-US" dirty="0" smtClean="0"/>
+              <a:t>User control</a:t>
+            </a:r>
+            <a:endParaRPr lang="en-US" dirty="0"/>
+          </a:p>
+        </p:txBody>
+      </p:sp>
+      <p:sp>
+        <p:nvSpPr>
+          <p:cNvPr id="3" name="Content Placeholder 2"/>
+          <p:cNvSpPr>
+            <a:spLocks noGrp="1"/>
+          </p:cNvSpPr>
+          <p:nvPr>
+            <p:ph idx="1"/>
+          </p:nvPr>
+        </p:nvSpPr>
+        <p:spPr/>
+        <p:txBody>
+          <a:bodyPr/>
+          <a:lstStyle/>
+          <a:p>
+            <a:r>
+              <a:rPr lang="en-US" dirty="0" smtClean="0"/>
+              <a:t>More user control</a:t>
+            </a:r>
+          </a:p>
+          <a:p>
+            <a:endParaRPr lang="en-US" dirty="0"/>
+          </a:p>
+          <a:p>
+            <a:r>
+              <a:rPr lang="en-US" dirty="0" smtClean="0"/>
+              <a:t>How often to replicate a directory</a:t>
+            </a:r>
+          </a:p>
+          <a:p>
+            <a:endParaRPr lang="en-US" dirty="0"/>
+          </a:p>
+          <a:p>
+            <a:r>
+              <a:rPr lang="en-US" dirty="0" smtClean="0"/>
+              <a:t>Special conditions i.e. only over wi-fi</a:t>
+            </a:r>
+          </a:p>
+          <a:p>
+            <a:endParaRPr lang="en-US" dirty="0"/>
+          </a:p>
+          <a:p>
+            <a:r>
+              <a:rPr lang="en-US" dirty="0" smtClean="0"/>
+              <a:t>Feedback on how changing settings may impact performance</a:t>
+            </a:r>
+          </a:p>
+          <a:p>
+            <a:endParaRPr lang="en-US" dirty="0"/>
+          </a:p>
+        </p:txBody>
+      </p:sp>
+    </p:spTree>
+    <p:extLst>
+      <p:ext uri="{BB962C8B-B14F-4D97-AF65-F5344CB8AC3E}">
+        <p14:creationId xmlns:p14="http://schemas.microsoft.com/office/powerpoint/2010/main" val="1951542562"/>
+      </p:ext>
+    </p:extLst>
+  </p:cSld>
+  <p:clrMapOvr>
+    <a:masterClrMapping/>
+  </p:clrMapOvr>
+  <p:timing>
+    <p:tnLst>
+      <p:par>
+        <p:cTn xmlns:p14="http://schemas.microsoft.com/office/powerpoint/2010/main" id="1" dur="indefinite" restart="never" nodeType="tmRoot"/>
+      </p:par>
+    </p:tnLst>
+  </p:timing>
+</p:sld>
+</file>
+
+<file path=ppt/slides/slide17.xml><?xml version="1.0" encoding="utf-8"?>
+<p:sld xmlns:a="http://schemas.openxmlformats.org/drawingml/2006/main" xmlns:r="http://schemas.openxmlformats.org/officeDocument/2006/relationships" xmlns:p="http://schemas.openxmlformats.org/presentationml/2006/main">
+  <p:cSld>
+    <p:spTree>
+      <p:nvGrpSpPr>
+        <p:cNvPr id="1" name=""/>
+        <p:cNvGrpSpPr/>
+        <p:nvPr/>
+      </p:nvGrpSpPr>
+      <p:grpSpPr>
+        <a:xfrm>
+          <a:off x="0" y="0"/>
+          <a:ext cx="0" cy="0"/>
+          <a:chOff x="0" y="0"/>
+          <a:chExt cx="0" cy="0"/>
+        </a:xfrm>
+      </p:grpSpPr>
+      <p:sp>
+        <p:nvSpPr>
+          <p:cNvPr id="2" name="Title 1"/>
+          <p:cNvSpPr>
+            <a:spLocks noGrp="1"/>
+          </p:cNvSpPr>
+          <p:nvPr>
+            <p:ph type="title"/>
+          </p:nvPr>
+        </p:nvSpPr>
+        <p:spPr/>
+        <p:txBody>
+          <a:bodyPr>
+            <a:normAutofit/>
+          </a:bodyPr>
+          <a:lstStyle/>
+          <a:p>
+            <a:r>
+              <a:rPr lang="en-US" dirty="0" smtClean="0"/>
+              <a:t>Statistics</a:t>
+            </a:r>
+            <a:endParaRPr lang="en-US" dirty="0"/>
+          </a:p>
+        </p:txBody>
+      </p:sp>
+      <p:sp>
+        <p:nvSpPr>
+          <p:cNvPr id="3" name="Content Placeholder 2"/>
+          <p:cNvSpPr>
+            <a:spLocks noGrp="1"/>
+          </p:cNvSpPr>
+          <p:nvPr>
+            <p:ph idx="1"/>
+          </p:nvPr>
+        </p:nvSpPr>
+        <p:spPr/>
+        <p:txBody>
+          <a:bodyPr>
+            <a:normAutofit lnSpcReduction="10000"/>
+          </a:bodyPr>
+          <a:lstStyle/>
+          <a:p>
+            <a:r>
+              <a:rPr lang="en-US" dirty="0" smtClean="0"/>
+              <a:t>What meaningful data can we gather from the program over time?</a:t>
+            </a:r>
+          </a:p>
+          <a:p>
+            <a:endParaRPr lang="en-US" dirty="0"/>
+          </a:p>
+          <a:p>
+            <a:r>
+              <a:rPr lang="en-US" dirty="0" smtClean="0"/>
+              <a:t>How is each edge in the graph being used?</a:t>
+            </a:r>
+          </a:p>
+          <a:p>
+            <a:endParaRPr lang="en-US" dirty="0"/>
+          </a:p>
+          <a:p>
+            <a:r>
+              <a:rPr lang="en-US" dirty="0" smtClean="0"/>
+              <a:t>How up to date is the graph?</a:t>
+            </a:r>
+          </a:p>
+          <a:p>
+            <a:endParaRPr lang="en-US" dirty="0"/>
+          </a:p>
+          <a:p>
+            <a:r>
+              <a:rPr lang="en-US" dirty="0" smtClean="0"/>
+              <a:t>Can we improve the settings from this knowledge?</a:t>
+            </a:r>
+            <a:endParaRPr lang="en-US" dirty="0"/>
+          </a:p>
+        </p:txBody>
+      </p:sp>
+    </p:spTree>
+    <p:extLst>
+      <p:ext uri="{BB962C8B-B14F-4D97-AF65-F5344CB8AC3E}">
+        <p14:creationId xmlns:p14="http://schemas.microsoft.com/office/powerpoint/2010/main" val="1444113534"/>
+      </p:ext>
+    </p:extLst>
+  </p:cSld>
+  <p:clrMapOvr>
+    <a:masterClrMapping/>
+  </p:clrMapOvr>
+  <p:timing>
+    <p:tnLst>
+      <p:par>
+        <p:cTn xmlns:p14="http://schemas.microsoft.com/office/powerpoint/2010/main" id="1" dur="indefinite" restart="never" nodeType="tmRoot"/>
+      </p:par>
+    </p:tnLst>
+  </p:timing>
+</p:sld>
+</file>
+
+<file path=ppt/slides/slide18.xml><?xml version="1.0" encoding="utf-8"?>
+<p:sld xmlns:a="http://schemas.openxmlformats.org/drawingml/2006/main" xmlns:r="http://schemas.openxmlformats.org/officeDocument/2006/relationships" xmlns:p="http://schemas.openxmlformats.org/presentationml/2006/main">
+  <p:cSld>
+    <p:spTree>
+      <p:nvGrpSpPr>
+        <p:cNvPr id="1" name=""/>
+        <p:cNvGrpSpPr/>
+        <p:nvPr/>
+      </p:nvGrpSpPr>
+      <p:grpSpPr>
+        <a:xfrm>
+          <a:off x="0" y="0"/>
+          <a:ext cx="0" cy="0"/>
+          <a:chOff x="0" y="0"/>
+          <a:chExt cx="0" cy="0"/>
+        </a:xfrm>
+      </p:grpSpPr>
+      <p:sp>
+        <p:nvSpPr>
+          <p:cNvPr id="2" name="Title 1"/>
+          <p:cNvSpPr>
+            <a:spLocks noGrp="1"/>
+          </p:cNvSpPr>
+          <p:nvPr>
+            <p:ph type="title"/>
+          </p:nvPr>
+        </p:nvSpPr>
+        <p:spPr/>
+        <p:txBody>
+          <a:bodyPr/>
+          <a:lstStyle/>
+          <a:p>
+            <a:r>
+              <a:rPr lang="en-US" dirty="0" smtClean="0"/>
+              <a:t>The end</a:t>
+            </a:r>
+            <a:endParaRPr lang="en-US" dirty="0"/>
+          </a:p>
+        </p:txBody>
+      </p:sp>
+      <p:sp>
+        <p:nvSpPr>
+          <p:cNvPr id="3" name="Content Placeholder 2"/>
+          <p:cNvSpPr>
+            <a:spLocks noGrp="1"/>
+          </p:cNvSpPr>
+          <p:nvPr>
+            <p:ph idx="1"/>
+          </p:nvPr>
+        </p:nvSpPr>
+        <p:spPr/>
+        <p:txBody>
+          <a:bodyPr/>
+          <a:lstStyle/>
+          <a:p>
+            <a:r>
+              <a:rPr lang="en-US" dirty="0" smtClean="0"/>
+              <a:t>Thanks for listening</a:t>
+            </a:r>
+            <a:endParaRPr lang="en-US" dirty="0"/>
+          </a:p>
+        </p:txBody>
+      </p:sp>
+    </p:spTree>
+    <p:extLst>
+      <p:ext uri="{BB962C8B-B14F-4D97-AF65-F5344CB8AC3E}">
+        <p14:creationId xmlns:p14="http://schemas.microsoft.com/office/powerpoint/2010/main" val="4096479416"/>
+      </p:ext>
+    </p:extLst>
+  </p:cSld>
+  <p:clrMapOvr>
+    <a:masterClrMapping/>
+  </p:clrMapOvr>
+  <p:timing>
+    <p:tnLst>
+      <p:par>
+        <p:cTn xmlns:p14="http://schemas.microsoft.com/office/powerpoint/2010/main" id="1" dur="indefinite" restart="never" nodeType="tmRoot"/>
+      </p:par>
+    </p:tnLst>
+  </p:timing>
 </p:sld>
 </file>
 
@@ -5860,6 +6516,30 @@
           </a:p>
         </p:txBody>
       </p:sp>
+      <p:pic>
+        <p:nvPicPr>
+          <p:cNvPr id="4" name="Picture 3"/>
+          <p:cNvPicPr>
+            <a:picLocks noChangeAspect="1"/>
+          </p:cNvPicPr>
+          <p:nvPr/>
+        </p:nvPicPr>
+        <p:blipFill>
+          <a:blip r:embed="rId2"/>
+          <a:stretch>
+            <a:fillRect/>
+          </a:stretch>
+        </p:blipFill>
+        <p:spPr>
+          <a:xfrm>
+            <a:off x="3166503" y="3949629"/>
+            <a:ext cx="2806495" cy="1894384"/>
+          </a:xfrm>
+          <a:prstGeom prst="rect">
+            <a:avLst/>
+          </a:prstGeom>
+        </p:spPr>
+      </p:pic>
     </p:spTree>
     <p:extLst>
       <p:ext uri="{BB962C8B-B14F-4D97-AF65-F5344CB8AC3E}">
@@ -5933,7 +6613,7 @@
         <p:spPr/>
         <p:txBody>
           <a:bodyPr>
-            <a:normAutofit fontScale="70000" lnSpcReduction="20000"/>
+            <a:normAutofit/>
           </a:bodyPr>
           <a:lstStyle/>
           <a:p>
@@ -5941,24 +6621,18 @@
               <a:rPr lang="en-US" b="1" dirty="0" smtClean="0"/>
               <a:t>Decentralised</a:t>
             </a:r>
-            <a:r>
-              <a:rPr lang="en-US" dirty="0"/>
-              <a:t>. It will not necessarily need to be run in “the cloud”, there should be no centralised server, just many cooperating client nodes. </a:t>
-            </a:r>
+          </a:p>
+          <a:p>
+            <a:endParaRPr lang="en-US" dirty="0"/>
           </a:p>
           <a:p>
             <a:r>
               <a:rPr lang="en-US" b="1" dirty="0" smtClean="0"/>
-              <a:t>File </a:t>
-            </a:r>
-            <a:r>
-              <a:rPr lang="en-US" b="1" dirty="0"/>
-              <a:t>synchronisation</a:t>
-            </a:r>
-            <a:r>
-              <a:rPr lang="en-US" dirty="0"/>
-              <a:t> between multiple clients—not just point-to- point between two clients. Clients may be running different operating systems. Clients may run on different networks, with different costs of access (including being disconnected from the Internet at times). </a:t>
-            </a:r>
+              <a:t>File synchronisation</a:t>
+            </a:r>
+          </a:p>
+          <a:p>
+            <a:endParaRPr lang="en-US" dirty="0"/>
           </a:p>
           <a:p>
             <a:r>
@@ -5967,26 +6641,22 @@
             </a:r>
             <a:r>
               <a:rPr lang="en-US" b="1" dirty="0"/>
-              <a:t>-grained user control</a:t>
-            </a:r>
-            <a:r>
-              <a:rPr lang="en-US" dirty="0"/>
-              <a:t> for the majority of the program’s functions, e.g., how often, and what, to replicate within different sets of files. ’What’ could be filename, filetype, filesize etc. </a:t>
-            </a:r>
+              <a:t>-grained user </a:t>
+            </a:r>
+            <a:r>
+              <a:rPr lang="en-US" b="1" dirty="0" smtClean="0"/>
+              <a:t>control</a:t>
+            </a:r>
+          </a:p>
+          <a:p>
+            <a:endParaRPr lang="en-US" dirty="0"/>
           </a:p>
           <a:p>
             <a:r>
               <a:rPr lang="en-US" b="1" dirty="0" smtClean="0"/>
               <a:t>Statistics</a:t>
             </a:r>
-            <a:r>
-              <a:rPr lang="en-US" dirty="0" smtClean="0"/>
-              <a:t> </a:t>
-            </a:r>
-            <a:r>
-              <a:rPr lang="en-US" dirty="0"/>
-              <a:t>about which files are being replicated, efficiency, cost (bandwidth, disk space). These statistics could also possible lead to a heuristic for when to sync a given file. </a:t>
-            </a:r>
+            <a:endParaRPr lang="en-US" dirty="0"/>
           </a:p>
           <a:p>
             <a:endParaRPr lang="en-US" dirty="0"/>
@@ -6161,6 +6831,13 @@
   <p:clrMapOvr>
     <a:masterClrMapping/>
   </p:clrMapOvr>
+  <p:timing>
+    <p:tnLst>
+      <p:par>
+        <p:cTn xmlns:p14="http://schemas.microsoft.com/office/powerpoint/2010/main" id="1" dur="indefinite" restart="never" nodeType="tmRoot"/>
+      </p:par>
+    </p:tnLst>
+  </p:timing>
 </p:sld>
 </file>
 
@@ -6303,8 +6980,12 @@
           <a:lstStyle/>
           <a:p>
             <a:r>
+              <a:rPr lang="en-US" dirty="0"/>
+              <a:t>Network </a:t>
+            </a:r>
+            <a:r>
               <a:rPr lang="en-US" dirty="0" smtClean="0"/>
-              <a:t>Virtual machines</a:t>
+              <a:t>topologys</a:t>
             </a:r>
             <a:endParaRPr lang="en-US" dirty="0"/>
           </a:p>
@@ -6312,12 +6993,12 @@
       </p:sp>
       <p:sp>
         <p:nvSpPr>
-          <p:cNvPr id="3" name="Content Placeholder 2"/>
-          <p:cNvSpPr>
-            <a:spLocks noGrp="1"/>
-          </p:cNvSpPr>
-          <p:nvPr>
-            <p:ph idx="1"/>
+          <p:cNvPr id="11" name="Text Placeholder 10"/>
+          <p:cNvSpPr>
+            <a:spLocks noGrp="1"/>
+          </p:cNvSpPr>
+          <p:nvPr>
+            <p:ph type="body" idx="1"/>
           </p:nvPr>
         </p:nvSpPr>
         <p:spPr/>
@@ -6327,25 +7008,77 @@
           <a:p>
             <a:r>
               <a:rPr lang="en-US" dirty="0" smtClean="0"/>
-              <a:t>Virtualbox</a:t>
-            </a:r>
-          </a:p>
-          <a:p>
+              <a:t>Bus</a:t>
+            </a:r>
             <a:endParaRPr lang="en-US" dirty="0"/>
           </a:p>
+        </p:txBody>
+      </p:sp>
+      <p:sp>
+        <p:nvSpPr>
+          <p:cNvPr id="12" name="Text Placeholder 11"/>
+          <p:cNvSpPr>
+            <a:spLocks noGrp="1"/>
+          </p:cNvSpPr>
+          <p:nvPr>
+            <p:ph type="body" sz="quarter" idx="3"/>
+          </p:nvPr>
+        </p:nvSpPr>
+        <p:spPr/>
+        <p:txBody>
+          <a:bodyPr/>
+          <a:lstStyle/>
           <a:p>
             <a:r>
               <a:rPr lang="en-US" dirty="0" smtClean="0"/>
-              <a:t>Vboxmanage script</a:t>
+              <a:t>Ring</a:t>
             </a:r>
             <a:endParaRPr lang="en-US" dirty="0"/>
           </a:p>
         </p:txBody>
       </p:sp>
+      <p:pic>
+        <p:nvPicPr>
+          <p:cNvPr id="17" name="Content Placeholder 16"/>
+          <p:cNvPicPr>
+            <a:picLocks noGrp="1" noChangeAspect="1"/>
+          </p:cNvPicPr>
+          <p:nvPr>
+            <p:ph sz="quarter" idx="13"/>
+          </p:nvPr>
+        </p:nvPicPr>
+        <p:blipFill>
+          <a:blip r:embed="rId2"/>
+          <a:srcRect t="-241285" b="-241285"/>
+          <a:stretch>
+            <a:fillRect/>
+          </a:stretch>
+        </p:blipFill>
+        <p:spPr/>
+      </p:pic>
+      <p:pic>
+        <p:nvPicPr>
+          <p:cNvPr id="18" name="Content Placeholder 17"/>
+          <p:cNvPicPr>
+            <a:picLocks noGrp="1" noChangeAspect="1"/>
+          </p:cNvPicPr>
+          <p:nvPr>
+            <p:ph sz="quarter" idx="14"/>
+          </p:nvPr>
+        </p:nvPicPr>
+        <p:blipFill>
+          <a:blip r:embed="rId3"/>
+          <a:srcRect t="-1095" b="-1095"/>
+          <a:stretch>
+            <a:fillRect/>
+          </a:stretch>
+        </p:blipFill>
+        <p:spPr/>
+      </p:pic>
     </p:spTree>
     <p:extLst>
       <p:ext uri="{BB962C8B-B14F-4D97-AF65-F5344CB8AC3E}">
-        <p14:creationId xmlns:p14="http://schemas.microsoft.com/office/powerpoint/2010/main" val="1413021392"/>
+        <p14:creationId xmlns:p14="http://schemas.microsoft.com/office/powerpoint/2010/main" val="3933155189"/>
       </p:ext>
     </p:extLst>
   </p:cSld>
@@ -6493,7 +7226,7 @@
     </p:spTree>
     <p:extLst>
       <p:ext uri="{BB962C8B-B14F-4D97-AF65-F5344CB8AC3E}">
-        <p14:creationId xmlns:p14="http://schemas.microsoft.com/office/powerpoint/2010/main" val="3933155189"/>
+        <p14:creationId xmlns:p14="http://schemas.microsoft.com/office/powerpoint/2010/main" val="882041453"/>
       </p:ext>
     </p:extLst>
   </p:cSld>

</xml_diff>